<commit_message>
created initial CSS3 and JS APIs decks
</commit_message>
<xml_diff>
--- a/2- HTML5 Core/HTML5Core.pptx
+++ b/2- HTML5 Core/HTML5Core.pptx
@@ -13936,11 +13936,7 @@
           <a:p>
             <a:r>
               <a:rPr lang="en-US" dirty="0" smtClean="0"/>
-              <a:t>HTML5 </a:t>
-            </a:r>
-            <a:r>
-              <a:rPr lang="en-US" dirty="0" smtClean="0"/>
-              <a:t>Forms*</a:t>
+              <a:t>HTML5 Forms*</a:t>
             </a:r>
             <a:endParaRPr lang="en-US" dirty="0"/>
           </a:p>
@@ -16666,11 +16662,7 @@
           <a:p>
             <a:r>
               <a:rPr lang="en-US" sz="6600" dirty="0" smtClean="0"/>
-              <a:t>“data</a:t>
-            </a:r>
-            <a:r>
-              <a:rPr lang="en-US" sz="6600" dirty="0" smtClean="0"/>
-              <a:t>-*”</a:t>
+              <a:t>“data-*”</a:t>
             </a:r>
             <a:endParaRPr lang="en-US" sz="6600" dirty="0"/>
           </a:p>
@@ -17347,55 +17339,7 @@
                 <a:ea typeface="+mn-ea"/>
                 <a:cs typeface="Arial" charset="0"/>
               </a:rPr>
-              <a:t>Browser Support for </a:t>
-            </a:r>
-            <a:r>
-              <a:rPr lang="en-US" sz="4800" b="0" kern="1200" cap="none" spc="-100" baseline="0" dirty="0" smtClean="0">
-                <a:ln w="3175">
-                  <a:noFill/>
-                </a:ln>
-                <a:gradFill flip="none" rotWithShape="1">
-                  <a:gsLst>
-                    <a:gs pos="0">
-                      <a:schemeClr val="tx1"/>
-                    </a:gs>
-                    <a:gs pos="86000">
-                      <a:schemeClr val="tx1"/>
-                    </a:gs>
-                  </a:gsLst>
-                  <a:lin ang="5400000" scaled="0"/>
-                  <a:tileRect/>
-                </a:gradFill>
-                <a:effectLst/>
-                <a:latin typeface="+mj-lt"/>
-                <a:ea typeface="+mn-ea"/>
-                <a:cs typeface="Arial" charset="0"/>
-              </a:rPr>
-              <a:t>SVG</a:t>
-            </a:r>
-            <a:r>
-              <a:rPr lang="en-US" sz="4800" b="0" kern="1200" cap="none" spc="-100" baseline="0" dirty="0" smtClean="0">
-                <a:ln w="3175">
-                  <a:noFill/>
-                </a:ln>
-                <a:gradFill flip="none" rotWithShape="1">
-                  <a:gsLst>
-                    <a:gs pos="0">
-                      <a:schemeClr val="tx1"/>
-                    </a:gs>
-                    <a:gs pos="86000">
-                      <a:schemeClr val="tx1"/>
-                    </a:gs>
-                  </a:gsLst>
-                  <a:lin ang="5400000" scaled="0"/>
-                  <a:tileRect/>
-                </a:gradFill>
-                <a:effectLst/>
-                <a:latin typeface="+mj-lt"/>
-                <a:ea typeface="+mn-ea"/>
-                <a:cs typeface="Arial" charset="0"/>
-              </a:rPr>
-              <a:t>	</a:t>
+              <a:t>Browser Support for SVG	</a:t>
             </a:r>
             <a:endParaRPr lang="en-US" dirty="0"/>
           </a:p>
@@ -18407,7 +18351,31 @@
                   <a:schemeClr val="tx2"/>
                 </a:solidFill>
               </a:rPr>
-              <a:t> in the “2- HTML5 Core/labs” folder</a:t>
+              <a:t> in the “2- </a:t>
+            </a:r>
+            <a:r>
+              <a:rPr lang="en-US" smtClean="0">
+                <a:solidFill>
+                  <a:schemeClr val="tx2"/>
+                </a:solidFill>
+              </a:rPr>
+              <a:t>HTML5 </a:t>
+            </a:r>
+            <a:r>
+              <a:rPr lang="en-US" smtClean="0">
+                <a:solidFill>
+                  <a:schemeClr val="tx2"/>
+                </a:solidFill>
+              </a:rPr>
+              <a:t>Core” </a:t>
+            </a:r>
+            <a:r>
+              <a:rPr lang="en-US" dirty="0" smtClean="0">
+                <a:solidFill>
+                  <a:schemeClr val="tx2"/>
+                </a:solidFill>
+              </a:rPr>
+              <a:t>folder</a:t>
             </a:r>
             <a:endParaRPr lang="en-US" dirty="0">
               <a:solidFill>

</xml_diff>

<commit_message>
Additional work to JavaScript APIs deck; change to HMTL5Core deck"
</commit_message>
<xml_diff>
--- a/2- HTML5 Core/HTML5Core.pptx
+++ b/2- HTML5 Core/HTML5Core.pptx
@@ -220,7 +220,7 @@
           <a:p>
             <a:fld id="{D1EA0DBE-4458-7349-8DB4-B45B1B6487F3}" type="datetimeFigureOut">
               <a:rPr lang="en-US" smtClean="0"/>
-              <a:t>1/3/12</a:t>
+              <a:t>1/4/12</a:t>
             </a:fld>
             <a:endParaRPr lang="en-US"/>
           </a:p>
@@ -14057,6 +14057,14 @@
           <a:bodyPr/>
           <a:lstStyle/>
           <a:p>
+            <a:r>
+              <a:rPr lang="en-US" dirty="0" smtClean="0"/>
+              <a:t>New Input Types </a:t>
+            </a:r>
+            <a:r>
+              <a:rPr lang="en-US" smtClean="0"/>
+              <a:t>and Attributes</a:t>
+            </a:r>
             <a:endParaRPr lang="en-US"/>
           </a:p>
         </p:txBody>
@@ -18359,15 +18367,7 @@
                   <a:schemeClr val="tx2"/>
                 </a:solidFill>
               </a:rPr>
-              <a:t>HTML5 </a:t>
-            </a:r>
-            <a:r>
-              <a:rPr lang="en-US" smtClean="0">
-                <a:solidFill>
-                  <a:schemeClr val="tx2"/>
-                </a:solidFill>
-              </a:rPr>
-              <a:t>Core” </a:t>
+              <a:t>HTML5 Core” </a:t>
             </a:r>
             <a:r>
               <a:rPr lang="en-US" dirty="0" smtClean="0">

</xml_diff>